<commit_message>
Updated lecture after reading
</commit_message>
<xml_diff>
--- a/L2 Writing code.pptx
+++ b/L2 Writing code.pptx
@@ -5,7 +5,7 @@
     <p:sldMasterId id="2147483648" r:id="rId1"/>
   </p:sldMasterIdLst>
   <p:notesMasterIdLst>
-    <p:notesMasterId r:id="rId10"/>
+    <p:notesMasterId r:id="rId12"/>
   </p:notesMasterIdLst>
   <p:sldIdLst>
     <p:sldId id="256" r:id="rId2"/>
@@ -15,7 +15,9 @@
     <p:sldId id="273" r:id="rId6"/>
     <p:sldId id="263" r:id="rId7"/>
     <p:sldId id="264" r:id="rId8"/>
-    <p:sldId id="268" r:id="rId9"/>
+    <p:sldId id="275" r:id="rId9"/>
+    <p:sldId id="268" r:id="rId10"/>
+    <p:sldId id="276" r:id="rId11"/>
   </p:sldIdLst>
   <p:sldSz cx="9144000" cy="6858000" type="screen4x3"/>
   <p:notesSz cx="6858000" cy="9144000"/>
@@ -982,8 +984,258 @@
             </a:r>
             <a:r>
               <a:rPr lang="en-US" dirty="0" smtClean="0"/>
-              <a:t> from dual</a:t>
-            </a:r>
+              <a:t> from </a:t>
+            </a:r>
+            <a:r>
+              <a:rPr lang="en-US" dirty="0" smtClean="0"/>
+              <a:t>dual</a:t>
+            </a:r>
+          </a:p>
+          <a:p>
+            <a:endParaRPr lang="en-US" dirty="0" smtClean="0"/>
+          </a:p>
+          <a:p>
+            <a:endParaRPr lang="en-US" dirty="0" smtClean="0"/>
+          </a:p>
+          <a:p>
+            <a:r>
+              <a:rPr lang="en-US" sz="1200" b="0" i="0" u="none" strike="noStrike" kern="1200" baseline="0" dirty="0" smtClean="0">
+                <a:solidFill>
+                  <a:schemeClr val="tx1"/>
+                </a:solidFill>
+                <a:latin typeface="+mn-lt"/>
+                <a:ea typeface="+mn-ea"/>
+                <a:cs typeface="+mn-cs"/>
+              </a:rPr>
+              <a:t>declare</a:t>
+            </a:r>
+          </a:p>
+          <a:p>
+            <a:r>
+              <a:rPr lang="en-US" sz="1200" b="0" i="0" u="none" strike="noStrike" kern="1200" baseline="0" dirty="0" smtClean="0">
+                <a:solidFill>
+                  <a:schemeClr val="tx1"/>
+                </a:solidFill>
+                <a:latin typeface="+mn-lt"/>
+                <a:ea typeface="+mn-ea"/>
+                <a:cs typeface="+mn-cs"/>
+              </a:rPr>
+              <a:t>    x number;</a:t>
+            </a:r>
+          </a:p>
+          <a:p>
+            <a:r>
+              <a:rPr lang="en-US" sz="1200" b="0" i="0" u="none" strike="noStrike" kern="1200" baseline="0" dirty="0" smtClean="0">
+                <a:solidFill>
+                  <a:schemeClr val="tx1"/>
+                </a:solidFill>
+                <a:latin typeface="+mn-lt"/>
+                <a:ea typeface="+mn-ea"/>
+                <a:cs typeface="+mn-cs"/>
+              </a:rPr>
+              <a:t>begin</a:t>
+            </a:r>
+          </a:p>
+          <a:p>
+            <a:r>
+              <a:rPr lang="en-US" sz="1200" b="0" i="0" u="none" strike="noStrike" kern="1200" baseline="0" dirty="0" smtClean="0">
+                <a:solidFill>
+                  <a:schemeClr val="tx1"/>
+                </a:solidFill>
+                <a:latin typeface="+mn-lt"/>
+                <a:ea typeface="+mn-ea"/>
+                <a:cs typeface="+mn-cs"/>
+              </a:rPr>
+              <a:t>    select </a:t>
+            </a:r>
+            <a:r>
+              <a:rPr lang="en-US" sz="1200" b="0" i="0" u="none" strike="noStrike" kern="1200" baseline="0" dirty="0" err="1" smtClean="0">
+                <a:solidFill>
+                  <a:schemeClr val="tx1"/>
+                </a:solidFill>
+                <a:latin typeface="+mn-lt"/>
+                <a:ea typeface="+mn-ea"/>
+                <a:cs typeface="+mn-cs"/>
+              </a:rPr>
+              <a:t>emp_seq.currval</a:t>
+            </a:r>
+            <a:r>
+              <a:rPr lang="en-US" sz="1200" b="0" i="0" u="none" strike="noStrike" kern="1200" baseline="0" dirty="0" smtClean="0">
+                <a:solidFill>
+                  <a:schemeClr val="tx1"/>
+                </a:solidFill>
+                <a:latin typeface="+mn-lt"/>
+                <a:ea typeface="+mn-ea"/>
+                <a:cs typeface="+mn-cs"/>
+              </a:rPr>
+              <a:t> into x from dual;</a:t>
+            </a:r>
+          </a:p>
+          <a:p>
+            <a:endParaRPr lang="en-US" sz="1200" b="0" i="0" u="none" strike="noStrike" kern="1200" baseline="0" dirty="0" smtClean="0">
+              <a:solidFill>
+                <a:schemeClr val="tx1"/>
+              </a:solidFill>
+              <a:latin typeface="+mn-lt"/>
+              <a:ea typeface="+mn-ea"/>
+              <a:cs typeface="+mn-cs"/>
+            </a:endParaRPr>
+          </a:p>
+          <a:p>
+            <a:r>
+              <a:rPr lang="en-US" sz="1200" b="0" i="0" u="none" strike="noStrike" kern="1200" baseline="0" dirty="0" smtClean="0">
+                <a:solidFill>
+                  <a:schemeClr val="tx1"/>
+                </a:solidFill>
+                <a:latin typeface="+mn-lt"/>
+                <a:ea typeface="+mn-ea"/>
+                <a:cs typeface="+mn-cs"/>
+              </a:rPr>
+              <a:t>    execute immediate 'alter sequence </a:t>
+            </a:r>
+            <a:r>
+              <a:rPr lang="en-US" sz="1200" b="0" i="0" u="none" strike="noStrike" kern="1200" baseline="0" dirty="0" err="1" smtClean="0">
+                <a:solidFill>
+                  <a:schemeClr val="tx1"/>
+                </a:solidFill>
+                <a:latin typeface="+mn-lt"/>
+                <a:ea typeface="+mn-ea"/>
+                <a:cs typeface="+mn-cs"/>
+              </a:rPr>
+              <a:t>emp_seq</a:t>
+            </a:r>
+            <a:r>
+              <a:rPr lang="en-US" sz="1200" b="0" i="0" u="none" strike="noStrike" kern="1200" baseline="0" dirty="0" smtClean="0">
+                <a:solidFill>
+                  <a:schemeClr val="tx1"/>
+                </a:solidFill>
+                <a:latin typeface="+mn-lt"/>
+                <a:ea typeface="+mn-ea"/>
+                <a:cs typeface="+mn-cs"/>
+              </a:rPr>
+              <a:t> increment by -'||(x-1);</a:t>
+            </a:r>
+          </a:p>
+          <a:p>
+            <a:r>
+              <a:rPr lang="en-US" sz="1200" b="0" i="0" u="none" strike="noStrike" kern="1200" baseline="0" dirty="0" smtClean="0">
+                <a:solidFill>
+                  <a:schemeClr val="tx1"/>
+                </a:solidFill>
+                <a:latin typeface="+mn-lt"/>
+                <a:ea typeface="+mn-ea"/>
+                <a:cs typeface="+mn-cs"/>
+              </a:rPr>
+              <a:t>    select </a:t>
+            </a:r>
+            <a:r>
+              <a:rPr lang="en-US" sz="1200" b="0" i="0" u="none" strike="noStrike" kern="1200" baseline="0" dirty="0" err="1" smtClean="0">
+                <a:solidFill>
+                  <a:schemeClr val="tx1"/>
+                </a:solidFill>
+                <a:latin typeface="+mn-lt"/>
+                <a:ea typeface="+mn-ea"/>
+                <a:cs typeface="+mn-cs"/>
+              </a:rPr>
+              <a:t>emp_seq.nextval</a:t>
+            </a:r>
+            <a:r>
+              <a:rPr lang="en-US" sz="1200" b="0" i="0" u="none" strike="noStrike" kern="1200" baseline="0" dirty="0" smtClean="0">
+                <a:solidFill>
+                  <a:schemeClr val="tx1"/>
+                </a:solidFill>
+                <a:latin typeface="+mn-lt"/>
+                <a:ea typeface="+mn-ea"/>
+                <a:cs typeface="+mn-cs"/>
+              </a:rPr>
+              <a:t> into x from dual;</a:t>
+            </a:r>
+          </a:p>
+          <a:p>
+            <a:r>
+              <a:rPr lang="en-US" sz="1200" b="0" i="0" u="none" strike="noStrike" kern="1200" baseline="0" dirty="0" smtClean="0">
+                <a:solidFill>
+                  <a:schemeClr val="tx1"/>
+                </a:solidFill>
+                <a:latin typeface="+mn-lt"/>
+                <a:ea typeface="+mn-ea"/>
+                <a:cs typeface="+mn-cs"/>
+              </a:rPr>
+              <a:t>    execute immediate 'alter sequence </a:t>
+            </a:r>
+            <a:r>
+              <a:rPr lang="en-US" sz="1200" b="0" i="0" u="none" strike="noStrike" kern="1200" baseline="0" dirty="0" err="1" smtClean="0">
+                <a:solidFill>
+                  <a:schemeClr val="tx1"/>
+                </a:solidFill>
+                <a:latin typeface="+mn-lt"/>
+                <a:ea typeface="+mn-ea"/>
+                <a:cs typeface="+mn-cs"/>
+              </a:rPr>
+              <a:t>emp_seq</a:t>
+            </a:r>
+            <a:r>
+              <a:rPr lang="en-US" sz="1200" b="0" i="0" u="none" strike="noStrike" kern="1200" baseline="0" dirty="0" smtClean="0">
+                <a:solidFill>
+                  <a:schemeClr val="tx1"/>
+                </a:solidFill>
+                <a:latin typeface="+mn-lt"/>
+                <a:ea typeface="+mn-ea"/>
+                <a:cs typeface="+mn-cs"/>
+              </a:rPr>
+              <a:t> increment by 1';</a:t>
+            </a:r>
+          </a:p>
+          <a:p>
+            <a:r>
+              <a:rPr lang="en-US" sz="1200" b="0" i="0" u="none" strike="noStrike" kern="1200" baseline="0" dirty="0" smtClean="0">
+                <a:solidFill>
+                  <a:schemeClr val="tx1"/>
+                </a:solidFill>
+                <a:latin typeface="+mn-lt"/>
+                <a:ea typeface="+mn-ea"/>
+                <a:cs typeface="+mn-cs"/>
+              </a:rPr>
+              <a:t>end;</a:t>
+            </a:r>
+          </a:p>
+          <a:p>
+            <a:r>
+              <a:rPr lang="en-US" sz="1200" b="0" i="0" u="none" strike="noStrike" kern="1200" baseline="0" dirty="0" smtClean="0">
+                <a:solidFill>
+                  <a:schemeClr val="tx1"/>
+                </a:solidFill>
+                <a:latin typeface="+mn-lt"/>
+                <a:ea typeface="+mn-ea"/>
+                <a:cs typeface="+mn-cs"/>
+              </a:rPr>
+              <a:t>select </a:t>
+            </a:r>
+            <a:r>
+              <a:rPr lang="en-US" sz="1200" b="0" i="0" u="none" strike="noStrike" kern="1200" baseline="0" dirty="0" err="1" smtClean="0">
+                <a:solidFill>
+                  <a:schemeClr val="tx1"/>
+                </a:solidFill>
+                <a:latin typeface="+mn-lt"/>
+                <a:ea typeface="+mn-ea"/>
+                <a:cs typeface="+mn-cs"/>
+              </a:rPr>
+              <a:t>emp_seq.nextval</a:t>
+            </a:r>
+            <a:r>
+              <a:rPr lang="en-US" sz="1200" b="0" i="0" u="none" strike="noStrike" kern="1200" baseline="0" dirty="0" smtClean="0">
+                <a:solidFill>
+                  <a:schemeClr val="tx1"/>
+                </a:solidFill>
+                <a:latin typeface="+mn-lt"/>
+                <a:ea typeface="+mn-ea"/>
+                <a:cs typeface="+mn-cs"/>
+              </a:rPr>
+              <a:t> from dual;</a:t>
+            </a:r>
+          </a:p>
+          <a:p>
+            <a:endParaRPr lang="en-US" dirty="0" smtClean="0"/>
           </a:p>
         </p:txBody>
       </p:sp>
@@ -3150,6 +3402,438 @@
     <p:extLst>
       <p:ext uri="{BB962C8B-B14F-4D97-AF65-F5344CB8AC3E}">
         <p14:creationId xmlns:p14="http://schemas.microsoft.com/office/powerpoint/2010/main" val="3913716118"/>
+      </p:ext>
+    </p:extLst>
+  </p:cSld>
+  <p:clrMapOvr>
+    <a:masterClrMapping/>
+  </p:clrMapOvr>
+</p:notes>
+</file>
+
+<file path=ppt/notesSlides/notesSlide8.xml><?xml version="1.0" encoding="utf-8"?>
+<p:notes xmlns:a="http://schemas.openxmlformats.org/drawingml/2006/main" xmlns:r="http://schemas.openxmlformats.org/officeDocument/2006/relationships" xmlns:p="http://schemas.openxmlformats.org/presentationml/2006/main">
+  <p:cSld>
+    <p:spTree>
+      <p:nvGrpSpPr>
+        <p:cNvPr id="1" name=""/>
+        <p:cNvGrpSpPr/>
+        <p:nvPr/>
+      </p:nvGrpSpPr>
+      <p:grpSpPr>
+        <a:xfrm>
+          <a:off x="0" y="0"/>
+          <a:ext cx="0" cy="0"/>
+          <a:chOff x="0" y="0"/>
+          <a:chExt cx="0" cy="0"/>
+        </a:xfrm>
+      </p:grpSpPr>
+      <p:sp>
+        <p:nvSpPr>
+          <p:cNvPr id="2" name="Slide Image Placeholder 1"/>
+          <p:cNvSpPr>
+            <a:spLocks noGrp="1" noRot="1" noChangeAspect="1"/>
+          </p:cNvSpPr>
+          <p:nvPr>
+            <p:ph type="sldImg"/>
+          </p:nvPr>
+        </p:nvSpPr>
+        <p:spPr/>
+      </p:sp>
+      <p:sp>
+        <p:nvSpPr>
+          <p:cNvPr id="3" name="Notes Placeholder 2"/>
+          <p:cNvSpPr>
+            <a:spLocks noGrp="1"/>
+          </p:cNvSpPr>
+          <p:nvPr>
+            <p:ph type="body" idx="1"/>
+          </p:nvPr>
+        </p:nvSpPr>
+        <p:spPr/>
+        <p:txBody>
+          <a:bodyPr/>
+          <a:lstStyle/>
+          <a:p>
+            <a:pPr marL="0" marR="0" indent="0" algn="l" defTabSz="914400" rtl="0" eaLnBrk="1" fontAlgn="auto" latinLnBrk="0" hangingPunct="1">
+              <a:lnSpc>
+                <a:spcPct val="100000"/>
+              </a:lnSpc>
+              <a:spcBef>
+                <a:spcPts val="0"/>
+              </a:spcBef>
+              <a:spcAft>
+                <a:spcPts val="0"/>
+              </a:spcAft>
+              <a:buClrTx/>
+              <a:buSzTx/>
+              <a:buFontTx/>
+              <a:buNone/>
+              <a:tabLst/>
+              <a:defRPr/>
+            </a:pPr>
+            <a:r>
+              <a:rPr lang="en-US" dirty="0" smtClean="0"/>
+              <a:t>--SQL</a:t>
+            </a:r>
+            <a:r>
+              <a:rPr lang="en-US" baseline="0" dirty="0" smtClean="0"/>
+              <a:t> to generate table with 12 Month</a:t>
+            </a:r>
+            <a:endParaRPr lang="en-US" dirty="0" smtClean="0"/>
+          </a:p>
+          <a:p>
+            <a:pPr marL="0" marR="0" indent="0" algn="l" defTabSz="914400" rtl="0" eaLnBrk="1" fontAlgn="auto" latinLnBrk="0" hangingPunct="1">
+              <a:lnSpc>
+                <a:spcPct val="100000"/>
+              </a:lnSpc>
+              <a:spcBef>
+                <a:spcPts val="0"/>
+              </a:spcBef>
+              <a:spcAft>
+                <a:spcPts val="0"/>
+              </a:spcAft>
+              <a:buClrTx/>
+              <a:buSzTx/>
+              <a:buFontTx/>
+              <a:buNone/>
+              <a:tabLst/>
+              <a:defRPr/>
+            </a:pPr>
+            <a:r>
+              <a:rPr lang="en-US" dirty="0" smtClean="0"/>
+              <a:t>select </a:t>
+            </a:r>
+            <a:r>
+              <a:rPr lang="en-US" dirty="0" err="1" smtClean="0"/>
+              <a:t>to_char</a:t>
+            </a:r>
+            <a:r>
+              <a:rPr lang="en-US" dirty="0" smtClean="0"/>
+              <a:t>(</a:t>
+            </a:r>
+            <a:r>
+              <a:rPr lang="en-US" dirty="0" err="1" smtClean="0"/>
+              <a:t>to_date</a:t>
+            </a:r>
+            <a:r>
+              <a:rPr lang="en-US" dirty="0" smtClean="0"/>
+              <a:t>(</a:t>
+            </a:r>
+            <a:r>
+              <a:rPr lang="en-US" dirty="0" err="1" smtClean="0"/>
+              <a:t>level,'MM</a:t>
+            </a:r>
+            <a:r>
+              <a:rPr lang="en-US" dirty="0" smtClean="0"/>
+              <a:t>'),'Month') title, </a:t>
+            </a:r>
+            <a:r>
+              <a:rPr lang="en-US" dirty="0" err="1" smtClean="0"/>
+              <a:t>to_number</a:t>
+            </a:r>
+            <a:r>
+              <a:rPr lang="en-US" dirty="0" smtClean="0"/>
+              <a:t>(</a:t>
+            </a:r>
+            <a:r>
+              <a:rPr lang="en-US" dirty="0" err="1" smtClean="0"/>
+              <a:t>to_char</a:t>
+            </a:r>
+            <a:r>
+              <a:rPr lang="en-US" dirty="0" smtClean="0"/>
+              <a:t>(</a:t>
+            </a:r>
+            <a:r>
+              <a:rPr lang="en-US" dirty="0" err="1" smtClean="0"/>
+              <a:t>to_date</a:t>
+            </a:r>
+            <a:r>
+              <a:rPr lang="en-US" dirty="0" smtClean="0"/>
+              <a:t>(</a:t>
+            </a:r>
+            <a:r>
+              <a:rPr lang="en-US" dirty="0" err="1" smtClean="0"/>
+              <a:t>level,'MM</a:t>
+            </a:r>
+            <a:r>
+              <a:rPr lang="en-US" dirty="0" smtClean="0"/>
+              <a:t>'),'MM')) </a:t>
+            </a:r>
+            <a:r>
+              <a:rPr lang="en-US" dirty="0" err="1" smtClean="0"/>
+              <a:t>st_date</a:t>
+            </a:r>
+            <a:r>
+              <a:rPr lang="en-US" dirty="0" smtClean="0"/>
+              <a:t> from dual connect by level &lt;= 12</a:t>
+            </a:r>
+          </a:p>
+          <a:p>
+            <a:endParaRPr lang="en-US" dirty="0" smtClean="0"/>
+          </a:p>
+          <a:p>
+            <a:r>
+              <a:rPr lang="en-US" dirty="0" smtClean="0"/>
+              <a:t>--SQL to add column with month</a:t>
+            </a:r>
+            <a:r>
+              <a:rPr lang="en-US" baseline="0" dirty="0" smtClean="0"/>
+              <a:t> number in the table</a:t>
+            </a:r>
+            <a:endParaRPr lang="en-US" dirty="0" smtClean="0"/>
+          </a:p>
+          <a:p>
+            <a:r>
+              <a:rPr lang="en-US" dirty="0" smtClean="0"/>
+              <a:t>alter table employees add month number;</a:t>
+            </a:r>
+          </a:p>
+          <a:p>
+            <a:r>
+              <a:rPr lang="en-US" dirty="0" smtClean="0"/>
+              <a:t>update employees set month = </a:t>
+            </a:r>
+            <a:r>
+              <a:rPr lang="en-US" dirty="0" err="1" smtClean="0"/>
+              <a:t>trunc</a:t>
+            </a:r>
+            <a:r>
+              <a:rPr lang="en-US" dirty="0" smtClean="0"/>
+              <a:t>(</a:t>
+            </a:r>
+            <a:r>
+              <a:rPr lang="en-US" b="1" i="1" dirty="0" err="1" smtClean="0"/>
+              <a:t>dbms_random.value</a:t>
+            </a:r>
+            <a:r>
+              <a:rPr lang="en-US" dirty="0" smtClean="0"/>
+              <a:t>(1,12))</a:t>
+            </a:r>
+          </a:p>
+          <a:p>
+            <a:endParaRPr lang="en-US" dirty="0" smtClean="0"/>
+          </a:p>
+          <a:p>
+            <a:r>
+              <a:rPr lang="en-US" dirty="0" smtClean="0"/>
+              <a:t>--SQL to count salary by month</a:t>
+            </a:r>
+          </a:p>
+          <a:p>
+            <a:r>
+              <a:rPr lang="en-US" dirty="0" smtClean="0"/>
+              <a:t>select sum(salary), </a:t>
+            </a:r>
+            <a:r>
+              <a:rPr lang="en-US" dirty="0" err="1" smtClean="0"/>
+              <a:t>m.title</a:t>
+            </a:r>
+            <a:r>
+              <a:rPr lang="en-US" dirty="0" smtClean="0"/>
+              <a:t> from</a:t>
+            </a:r>
+          </a:p>
+          <a:p>
+            <a:r>
+              <a:rPr lang="en-US" dirty="0" smtClean="0"/>
+              <a:t>(select </a:t>
+            </a:r>
+            <a:r>
+              <a:rPr lang="en-US" dirty="0" err="1" smtClean="0"/>
+              <a:t>to_char</a:t>
+            </a:r>
+            <a:r>
+              <a:rPr lang="en-US" dirty="0" smtClean="0"/>
+              <a:t>(</a:t>
+            </a:r>
+            <a:r>
+              <a:rPr lang="en-US" dirty="0" err="1" smtClean="0"/>
+              <a:t>to_date</a:t>
+            </a:r>
+            <a:r>
+              <a:rPr lang="en-US" dirty="0" smtClean="0"/>
+              <a:t>(</a:t>
+            </a:r>
+            <a:r>
+              <a:rPr lang="en-US" dirty="0" err="1" smtClean="0"/>
+              <a:t>level,'MM</a:t>
+            </a:r>
+            <a:r>
+              <a:rPr lang="en-US" dirty="0" smtClean="0"/>
+              <a:t>'),'Month') title, </a:t>
+            </a:r>
+            <a:r>
+              <a:rPr lang="en-US" dirty="0" err="1" smtClean="0"/>
+              <a:t>to_number</a:t>
+            </a:r>
+            <a:r>
+              <a:rPr lang="en-US" dirty="0" smtClean="0"/>
+              <a:t>(</a:t>
+            </a:r>
+            <a:r>
+              <a:rPr lang="en-US" dirty="0" err="1" smtClean="0"/>
+              <a:t>to_char</a:t>
+            </a:r>
+            <a:r>
+              <a:rPr lang="en-US" dirty="0" smtClean="0"/>
+              <a:t>(</a:t>
+            </a:r>
+            <a:r>
+              <a:rPr lang="en-US" dirty="0" err="1" smtClean="0"/>
+              <a:t>to_date</a:t>
+            </a:r>
+            <a:r>
+              <a:rPr lang="en-US" dirty="0" smtClean="0"/>
+              <a:t>(</a:t>
+            </a:r>
+            <a:r>
+              <a:rPr lang="en-US" dirty="0" err="1" smtClean="0"/>
+              <a:t>level,'MM</a:t>
+            </a:r>
+            <a:r>
+              <a:rPr lang="en-US" dirty="0" smtClean="0"/>
+              <a:t>'),'MM')) </a:t>
+            </a:r>
+            <a:r>
+              <a:rPr lang="en-US" dirty="0" err="1" smtClean="0"/>
+              <a:t>st_date</a:t>
+            </a:r>
+            <a:r>
+              <a:rPr lang="en-US" dirty="0" smtClean="0"/>
+              <a:t> from dual connect by level &lt;= 12) m</a:t>
+            </a:r>
+          </a:p>
+          <a:p>
+            <a:r>
+              <a:rPr lang="en-US" dirty="0" smtClean="0"/>
+              <a:t>join employees e on </a:t>
+            </a:r>
+            <a:r>
+              <a:rPr lang="en-US" dirty="0" err="1" smtClean="0"/>
+              <a:t>e.mnth</a:t>
+            </a:r>
+            <a:r>
+              <a:rPr lang="en-US" dirty="0" smtClean="0"/>
+              <a:t>=</a:t>
+            </a:r>
+            <a:r>
+              <a:rPr lang="en-US" dirty="0" err="1" smtClean="0"/>
+              <a:t>m.st_date</a:t>
+            </a:r>
+            <a:endParaRPr lang="en-US" dirty="0" smtClean="0"/>
+          </a:p>
+          <a:p>
+            <a:r>
+              <a:rPr lang="en-US" dirty="0" smtClean="0"/>
+              <a:t>group by </a:t>
+            </a:r>
+            <a:r>
+              <a:rPr lang="en-US" dirty="0" err="1" smtClean="0"/>
+              <a:t>m.title</a:t>
+            </a:r>
+            <a:endParaRPr lang="en-US" dirty="0" smtClean="0"/>
+          </a:p>
+          <a:p>
+            <a:endParaRPr lang="en-US" dirty="0" smtClean="0"/>
+          </a:p>
+          <a:p>
+            <a:r>
+              <a:rPr lang="en-US" dirty="0" smtClean="0"/>
+              <a:t>--</a:t>
+            </a:r>
+            <a:r>
+              <a:rPr lang="en-US" dirty="0" err="1" smtClean="0"/>
+              <a:t>sql</a:t>
+            </a:r>
+            <a:r>
+              <a:rPr lang="en-US" dirty="0" smtClean="0"/>
+              <a:t> to create a </a:t>
+            </a:r>
+            <a:r>
+              <a:rPr lang="en-US" smtClean="0"/>
+              <a:t>tree for parent/child</a:t>
+            </a:r>
+            <a:endParaRPr lang="en-US" dirty="0" smtClean="0"/>
+          </a:p>
+          <a:p>
+            <a:r>
+              <a:rPr lang="en-US" dirty="0" smtClean="0"/>
+              <a:t>select emp.*,SYS_CONNECT_BY_PATH(child, '/') "Path" from</a:t>
+            </a:r>
+          </a:p>
+          <a:p>
+            <a:r>
+              <a:rPr lang="en-US" dirty="0" smtClean="0"/>
+              <a:t>(select </a:t>
+            </a:r>
+            <a:r>
+              <a:rPr lang="en-US" dirty="0" err="1" smtClean="0"/>
+              <a:t>employee_id</a:t>
+            </a:r>
+            <a:r>
+              <a:rPr lang="en-US" dirty="0" smtClean="0"/>
+              <a:t> child, </a:t>
+            </a:r>
+            <a:r>
+              <a:rPr lang="en-US" dirty="0" err="1" smtClean="0"/>
+              <a:t>manager_id</a:t>
+            </a:r>
+            <a:r>
+              <a:rPr lang="en-US" dirty="0" smtClean="0"/>
+              <a:t> parent from employees) </a:t>
+            </a:r>
+            <a:r>
+              <a:rPr lang="en-US" dirty="0" err="1" smtClean="0"/>
+              <a:t>emp</a:t>
+            </a:r>
+            <a:endParaRPr lang="en-US" dirty="0" smtClean="0"/>
+          </a:p>
+          <a:p>
+            <a:r>
+              <a:rPr lang="en-US" dirty="0" smtClean="0"/>
+              <a:t>connect by prior child = parent </a:t>
+            </a:r>
+          </a:p>
+          <a:p>
+            <a:r>
+              <a:rPr lang="en-US" i="1" dirty="0" smtClean="0"/>
+              <a:t>--start with parent = null</a:t>
+            </a:r>
+            <a:endParaRPr lang="en-US" dirty="0" smtClean="0"/>
+          </a:p>
+          <a:p>
+            <a:endParaRPr lang="en-US" dirty="0"/>
+          </a:p>
+        </p:txBody>
+      </p:sp>
+      <p:sp>
+        <p:nvSpPr>
+          <p:cNvPr id="4" name="Slide Number Placeholder 3"/>
+          <p:cNvSpPr>
+            <a:spLocks noGrp="1"/>
+          </p:cNvSpPr>
+          <p:nvPr>
+            <p:ph type="sldNum" sz="quarter" idx="10"/>
+          </p:nvPr>
+        </p:nvSpPr>
+        <p:spPr/>
+        <p:txBody>
+          <a:bodyPr/>
+          <a:lstStyle/>
+          <a:p>
+            <a:fld id="{C7FF5C99-9852-4B46-B102-0710872716CD}" type="slidenum">
+              <a:rPr lang="en-US" smtClean="0"/>
+              <a:t>8</a:t>
+            </a:fld>
+            <a:endParaRPr lang="en-US"/>
+          </a:p>
+        </p:txBody>
+      </p:sp>
+    </p:spTree>
+    <p:extLst>
+      <p:ext uri="{BB962C8B-B14F-4D97-AF65-F5344CB8AC3E}">
+        <p14:creationId xmlns:p14="http://schemas.microsoft.com/office/powerpoint/2010/main" val="3502746639"/>
       </p:ext>
     </p:extLst>
   </p:cSld>
@@ -6201,15 +6885,7 @@
                   <a:schemeClr val="tx1"/>
                 </a:solidFill>
               </a:rPr>
-              <a:t>Lecture </a:t>
-            </a:r>
-            <a:r>
-              <a:rPr lang="en-US" dirty="0" smtClean="0">
-                <a:solidFill>
-                  <a:schemeClr val="tx1"/>
-                </a:solidFill>
-              </a:rPr>
-              <a:t>2</a:t>
+              <a:t>Lecture 2</a:t>
             </a:r>
             <a:endParaRPr lang="en-US" dirty="0">
               <a:solidFill>
@@ -6223,6 +6899,117 @@
     <p:extLst>
       <p:ext uri="{BB962C8B-B14F-4D97-AF65-F5344CB8AC3E}">
         <p14:creationId xmlns:p14="http://schemas.microsoft.com/office/powerpoint/2010/main" val="2624297537"/>
+      </p:ext>
+    </p:extLst>
+  </p:cSld>
+  <p:clrMapOvr>
+    <a:masterClrMapping/>
+  </p:clrMapOvr>
+</p:sld>
+</file>
+
+<file path=ppt/slides/slide10.xml><?xml version="1.0" encoding="utf-8"?>
+<p:sld xmlns:a="http://schemas.openxmlformats.org/drawingml/2006/main" xmlns:r="http://schemas.openxmlformats.org/officeDocument/2006/relationships" xmlns:p="http://schemas.openxmlformats.org/presentationml/2006/main">
+  <p:cSld>
+    <p:spTree>
+      <p:nvGrpSpPr>
+        <p:cNvPr id="1" name=""/>
+        <p:cNvGrpSpPr/>
+        <p:nvPr/>
+      </p:nvGrpSpPr>
+      <p:grpSpPr>
+        <a:xfrm>
+          <a:off x="0" y="0"/>
+          <a:ext cx="0" cy="0"/>
+          <a:chOff x="0" y="0"/>
+          <a:chExt cx="0" cy="0"/>
+        </a:xfrm>
+      </p:grpSpPr>
+      <p:sp>
+        <p:nvSpPr>
+          <p:cNvPr id="2" name="Title 1"/>
+          <p:cNvSpPr>
+            <a:spLocks noGrp="1"/>
+          </p:cNvSpPr>
+          <p:nvPr>
+            <p:ph type="title"/>
+          </p:nvPr>
+        </p:nvSpPr>
+        <p:spPr/>
+        <p:txBody>
+          <a:bodyPr/>
+          <a:lstStyle/>
+          <a:p>
+            <a:r>
+              <a:rPr lang="en-US" dirty="0" smtClean="0"/>
+              <a:t>Materials</a:t>
+            </a:r>
+            <a:endParaRPr lang="en-US" dirty="0"/>
+          </a:p>
+        </p:txBody>
+      </p:sp>
+      <p:sp>
+        <p:nvSpPr>
+          <p:cNvPr id="3" name="Content Placeholder 2"/>
+          <p:cNvSpPr>
+            <a:spLocks noGrp="1"/>
+          </p:cNvSpPr>
+          <p:nvPr>
+            <p:ph idx="1"/>
+          </p:nvPr>
+        </p:nvSpPr>
+        <p:spPr/>
+        <p:txBody>
+          <a:bodyPr/>
+          <a:lstStyle/>
+          <a:p>
+            <a:r>
+              <a:rPr lang="en-US" dirty="0" smtClean="0">
+                <a:hlinkClick r:id="rId2"/>
+              </a:rPr>
+              <a:t>github.com/</a:t>
+            </a:r>
+            <a:r>
+              <a:rPr lang="en-US" dirty="0" err="1" smtClean="0">
+                <a:hlinkClick r:id="rId2"/>
+              </a:rPr>
+              <a:t>vmorev</a:t>
+            </a:r>
+            <a:r>
+              <a:rPr lang="en-US" dirty="0" smtClean="0">
+                <a:hlinkClick r:id="rId2"/>
+              </a:rPr>
+              <a:t>/</a:t>
+            </a:r>
+            <a:r>
+              <a:rPr lang="en-US" dirty="0" err="1" smtClean="0">
+                <a:hlinkClick r:id="rId2"/>
+              </a:rPr>
+              <a:t>SQL_lectures</a:t>
+            </a:r>
+            <a:endParaRPr lang="en-US" dirty="0" smtClean="0"/>
+          </a:p>
+          <a:p>
+            <a:endParaRPr lang="en-US" dirty="0"/>
+          </a:p>
+          <a:p>
+            <a:r>
+              <a:rPr lang="en-US" dirty="0" smtClean="0">
+                <a:hlinkClick r:id="rId3"/>
+              </a:rPr>
+              <a:t>habrahabr.ru/post/101544</a:t>
+            </a:r>
+            <a:endParaRPr lang="en-US" dirty="0" smtClean="0"/>
+          </a:p>
+          <a:p>
+            <a:endParaRPr lang="en-US" dirty="0"/>
+          </a:p>
+        </p:txBody>
+      </p:sp>
+    </p:spTree>
+    <p:extLst>
+      <p:ext uri="{BB962C8B-B14F-4D97-AF65-F5344CB8AC3E}">
+        <p14:creationId xmlns:p14="http://schemas.microsoft.com/office/powerpoint/2010/main" val="2805238593"/>
       </p:ext>
     </p:extLst>
   </p:cSld>
@@ -6375,17 +7162,7 @@
                   </a:schemeClr>
                 </a:solidFill>
               </a:rPr>
-              <a:t>Temporary </a:t>
-            </a:r>
-            <a:r>
-              <a:rPr lang="en-US" dirty="0" smtClean="0">
-                <a:solidFill>
-                  <a:schemeClr val="bg1">
-                    <a:lumMod val="65000"/>
-                  </a:schemeClr>
-                </a:solidFill>
-              </a:rPr>
-              <a:t>tables</a:t>
+              <a:t>Temporary tables</a:t>
             </a:r>
           </a:p>
           <a:p>
@@ -6393,7 +7170,6 @@
               <a:rPr lang="en-US" dirty="0" smtClean="0"/>
               <a:t>Sequences</a:t>
             </a:r>
-            <a:endParaRPr lang="en-US" dirty="0" smtClean="0"/>
           </a:p>
         </p:txBody>
       </p:sp>
@@ -6566,7 +7342,11 @@
             </a:r>
             <a:r>
               <a:rPr lang="en-US" dirty="0" smtClean="0"/>
-              <a:t>&lt;NUMBER&gt;</a:t>
+              <a:t>&lt;NUMBER</a:t>
+            </a:r>
+            <a:r>
+              <a:rPr lang="en-US" dirty="0" smtClean="0"/>
+              <a:t>&gt;</a:t>
             </a:r>
             <a:endParaRPr lang="en-US" dirty="0"/>
           </a:p>
@@ -7068,7 +7848,7 @@
           <a:p>
             <a:r>
               <a:rPr lang="en-US" dirty="0" smtClean="0"/>
-              <a:t>Home task</a:t>
+              <a:t>Extra: connect by</a:t>
             </a:r>
             <a:endParaRPr lang="en-US" dirty="0"/>
           </a:p>
@@ -7093,41 +7873,173 @@
           <a:p>
             <a:r>
               <a:rPr lang="en-US" dirty="0" smtClean="0"/>
-              <a:t>Log all changes in all tables (inserts, deletes, updates) using triggers and extra tables</a:t>
-            </a:r>
-          </a:p>
-          <a:p>
-            <a:r>
-              <a:rPr lang="en-US" dirty="0" smtClean="0"/>
-              <a:t>Create report (SQL select) to show</a:t>
+              <a:t>Connect by</a:t>
+            </a:r>
+          </a:p>
+          <a:p>
+            <a:r>
+              <a:rPr lang="en-US" dirty="0" smtClean="0"/>
+              <a:t>Level</a:t>
+            </a:r>
+          </a:p>
+          <a:p>
+            <a:r>
+              <a:rPr lang="en-US" dirty="0" err="1" smtClean="0"/>
+              <a:t>sys_connect_by_path</a:t>
+            </a:r>
+            <a:r>
+              <a:rPr lang="en-US" dirty="0" smtClean="0"/>
+              <a:t> (&lt;FIELD&gt;, </a:t>
+            </a:r>
+            <a:r>
+              <a:rPr lang="en-US" dirty="0"/>
+              <a:t>'/')</a:t>
+            </a:r>
+            <a:endParaRPr lang="en-US" dirty="0" smtClean="0"/>
+          </a:p>
+          <a:p>
+            <a:endParaRPr lang="en-US" dirty="0"/>
+          </a:p>
+        </p:txBody>
+      </p:sp>
+    </p:spTree>
+    <p:extLst>
+      <p:ext uri="{BB962C8B-B14F-4D97-AF65-F5344CB8AC3E}">
+        <p14:creationId xmlns:p14="http://schemas.microsoft.com/office/powerpoint/2010/main" val="2023485926"/>
+      </p:ext>
+    </p:extLst>
+  </p:cSld>
+  <p:clrMapOvr>
+    <a:masterClrMapping/>
+  </p:clrMapOvr>
+</p:sld>
+</file>
+
+<file path=ppt/slides/slide9.xml><?xml version="1.0" encoding="utf-8"?>
+<p:sld xmlns:a="http://schemas.openxmlformats.org/drawingml/2006/main" xmlns:r="http://schemas.openxmlformats.org/officeDocument/2006/relationships" xmlns:p="http://schemas.openxmlformats.org/presentationml/2006/main">
+  <p:cSld>
+    <p:spTree>
+      <p:nvGrpSpPr>
+        <p:cNvPr id="1" name=""/>
+        <p:cNvGrpSpPr/>
+        <p:nvPr/>
+      </p:nvGrpSpPr>
+      <p:grpSpPr>
+        <a:xfrm>
+          <a:off x="0" y="0"/>
+          <a:ext cx="0" cy="0"/>
+          <a:chOff x="0" y="0"/>
+          <a:chExt cx="0" cy="0"/>
+        </a:xfrm>
+      </p:grpSpPr>
+      <p:sp>
+        <p:nvSpPr>
+          <p:cNvPr id="2" name="Title 1"/>
+          <p:cNvSpPr>
+            <a:spLocks noGrp="1"/>
+          </p:cNvSpPr>
+          <p:nvPr>
+            <p:ph type="title"/>
+          </p:nvPr>
+        </p:nvSpPr>
+        <p:spPr/>
+        <p:txBody>
+          <a:bodyPr/>
+          <a:lstStyle/>
+          <a:p>
+            <a:r>
+              <a:rPr lang="en-US" dirty="0" smtClean="0"/>
+              <a:t>Home task</a:t>
+            </a:r>
+            <a:endParaRPr lang="en-US" dirty="0"/>
+          </a:p>
+        </p:txBody>
+      </p:sp>
+      <p:sp>
+        <p:nvSpPr>
+          <p:cNvPr id="3" name="Content Placeholder 2"/>
+          <p:cNvSpPr>
+            <a:spLocks noGrp="1"/>
+          </p:cNvSpPr>
+          <p:nvPr>
+            <p:ph idx="1"/>
+          </p:nvPr>
+        </p:nvSpPr>
+        <p:spPr/>
+        <p:txBody>
+          <a:bodyPr>
+            <a:normAutofit/>
+          </a:bodyPr>
+          <a:lstStyle/>
+          <a:p>
+            <a:r>
+              <a:rPr lang="en-US" dirty="0" smtClean="0"/>
+              <a:t>1. Log </a:t>
+            </a:r>
+            <a:r>
+              <a:rPr lang="en-US" dirty="0" smtClean="0"/>
+              <a:t>all changes in all tables (inserts, deletes, updates) using triggers and extra </a:t>
+            </a:r>
+            <a:r>
+              <a:rPr lang="en-US" dirty="0" smtClean="0"/>
+              <a:t>tables</a:t>
+            </a:r>
+          </a:p>
+          <a:p>
+            <a:r>
+              <a:rPr lang="en-US" dirty="0"/>
+              <a:t>Create report to show</a:t>
             </a:r>
           </a:p>
           <a:p>
             <a:pPr lvl="1"/>
             <a:r>
-              <a:rPr lang="en-US" dirty="0" smtClean="0"/>
+              <a:rPr lang="en-US" dirty="0"/>
               <a:t>Country, </a:t>
             </a:r>
             <a:r>
-              <a:rPr lang="en-US" dirty="0" err="1" smtClean="0"/>
+              <a:rPr lang="en-US" dirty="0" err="1"/>
               <a:t>dep</a:t>
             </a:r>
             <a:r>
-              <a:rPr lang="en-US" dirty="0" smtClean="0"/>
-              <a:t>, man subm1, subm2, </a:t>
-            </a:r>
-            <a:r>
-              <a:rPr lang="en-US" dirty="0" err="1" smtClean="0"/>
+              <a:rPr lang="en-US" dirty="0"/>
+              <a:t>, man, subm1, subm2, </a:t>
+            </a:r>
+            <a:r>
+              <a:rPr lang="en-US" dirty="0" err="1"/>
               <a:t>emp</a:t>
             </a:r>
+            <a:endParaRPr lang="en-US" dirty="0"/>
+          </a:p>
+          <a:p>
+            <a:r>
+              <a:rPr lang="en-US" dirty="0" smtClean="0"/>
+              <a:t>A</a:t>
+            </a:r>
+            <a:r>
+              <a:rPr lang="en-US" dirty="0" smtClean="0"/>
+              <a:t>djust </a:t>
+            </a:r>
+            <a:r>
+              <a:rPr lang="en-US" dirty="0"/>
+              <a:t>report to show </a:t>
+            </a:r>
+            <a:r>
+              <a:rPr lang="en-US" dirty="0" smtClean="0"/>
+              <a:t>the same but </a:t>
+            </a:r>
+            <a:r>
+              <a:rPr lang="en-US" dirty="0"/>
+              <a:t>for specific date in the </a:t>
+            </a:r>
+            <a:r>
+              <a:rPr lang="en-US" dirty="0" smtClean="0"/>
+              <a:t>past (i.e. how it was on Jan-3 2000)</a:t>
+            </a:r>
+            <a:endParaRPr lang="en-US" dirty="0"/>
+          </a:p>
+          <a:p>
             <a:endParaRPr lang="en-US" dirty="0" smtClean="0"/>
-          </a:p>
-          <a:p>
-            <a:r>
-              <a:rPr lang="en-US" dirty="0" smtClean="0"/>
-              <a:t>Adjust report to show same data but for specific date in the past</a:t>
-            </a:r>
-            <a:endParaRPr lang="en-US" dirty="0"/>
           </a:p>
         </p:txBody>
       </p:sp>

</xml_diff>